<commit_message>
Update presentation for the data aggregation experiment
</commit_message>
<xml_diff>
--- a/projects/wavelet_dataAggregation/DataAggregation.pptx
+++ b/projects/wavelet_dataAggregation/DataAggregation.pptx
@@ -9,13 +9,13 @@
     <p:sldId id="259" r:id="rId3"/>
     <p:sldId id="260" r:id="rId4"/>
     <p:sldId id="261" r:id="rId5"/>
-    <p:sldId id="262" r:id="rId6"/>
-    <p:sldId id="263" r:id="rId7"/>
-    <p:sldId id="264" r:id="rId8"/>
-    <p:sldId id="265" r:id="rId9"/>
-    <p:sldId id="266" r:id="rId10"/>
-    <p:sldId id="267" r:id="rId11"/>
-    <p:sldId id="268" r:id="rId12"/>
+    <p:sldId id="263" r:id="rId6"/>
+    <p:sldId id="264" r:id="rId7"/>
+    <p:sldId id="265" r:id="rId8"/>
+    <p:sldId id="266" r:id="rId9"/>
+    <p:sldId id="274" r:id="rId10"/>
+    <p:sldId id="275" r:id="rId11"/>
+    <p:sldId id="276" r:id="rId12"/>
     <p:sldId id="269" r:id="rId13"/>
     <p:sldId id="270" r:id="rId14"/>
     <p:sldId id="272" r:id="rId15"/>
@@ -302,7 +302,7 @@
           <a:p>
             <a:fld id="{D9FE38A3-3E9D-3844-8113-0F0F6CE61532}" type="datetimeFigureOut">
               <a:rPr lang="en-US" smtClean="0"/>
-              <a:t>10/22/15</a:t>
+              <a:t>11/6/15</a:t>
             </a:fld>
             <a:endParaRPr lang="en-US"/>
           </a:p>
@@ -472,7 +472,7 @@
           <a:p>
             <a:fld id="{D9FE38A3-3E9D-3844-8113-0F0F6CE61532}" type="datetimeFigureOut">
               <a:rPr lang="en-US" smtClean="0"/>
-              <a:t>10/22/15</a:t>
+              <a:t>11/6/15</a:t>
             </a:fld>
             <a:endParaRPr lang="en-US"/>
           </a:p>
@@ -652,7 +652,7 @@
           <a:p>
             <a:fld id="{D9FE38A3-3E9D-3844-8113-0F0F6CE61532}" type="datetimeFigureOut">
               <a:rPr lang="en-US" smtClean="0"/>
-              <a:t>10/22/15</a:t>
+              <a:t>11/6/15</a:t>
             </a:fld>
             <a:endParaRPr lang="en-US"/>
           </a:p>
@@ -822,7 +822,7 @@
           <a:p>
             <a:fld id="{D9FE38A3-3E9D-3844-8113-0F0F6CE61532}" type="datetimeFigureOut">
               <a:rPr lang="en-US" smtClean="0"/>
-              <a:t>10/22/15</a:t>
+              <a:t>11/6/15</a:t>
             </a:fld>
             <a:endParaRPr lang="en-US"/>
           </a:p>
@@ -1068,7 +1068,7 @@
           <a:p>
             <a:fld id="{D9FE38A3-3E9D-3844-8113-0F0F6CE61532}" type="datetimeFigureOut">
               <a:rPr lang="en-US" smtClean="0"/>
-              <a:t>10/22/15</a:t>
+              <a:t>11/6/15</a:t>
             </a:fld>
             <a:endParaRPr lang="en-US"/>
           </a:p>
@@ -1356,7 +1356,7 @@
           <a:p>
             <a:fld id="{D9FE38A3-3E9D-3844-8113-0F0F6CE61532}" type="datetimeFigureOut">
               <a:rPr lang="en-US" smtClean="0"/>
-              <a:t>10/22/15</a:t>
+              <a:t>11/6/15</a:t>
             </a:fld>
             <a:endParaRPr lang="en-US"/>
           </a:p>
@@ -1778,7 +1778,7 @@
           <a:p>
             <a:fld id="{D9FE38A3-3E9D-3844-8113-0F0F6CE61532}" type="datetimeFigureOut">
               <a:rPr lang="en-US" smtClean="0"/>
-              <a:t>10/22/15</a:t>
+              <a:t>11/6/15</a:t>
             </a:fld>
             <a:endParaRPr lang="en-US"/>
           </a:p>
@@ -1896,7 +1896,7 @@
           <a:p>
             <a:fld id="{D9FE38A3-3E9D-3844-8113-0F0F6CE61532}" type="datetimeFigureOut">
               <a:rPr lang="en-US" smtClean="0"/>
-              <a:t>10/22/15</a:t>
+              <a:t>11/6/15</a:t>
             </a:fld>
             <a:endParaRPr lang="en-US"/>
           </a:p>
@@ -1991,7 +1991,7 @@
           <a:p>
             <a:fld id="{D9FE38A3-3E9D-3844-8113-0F0F6CE61532}" type="datetimeFigureOut">
               <a:rPr lang="en-US" smtClean="0"/>
-              <a:t>10/22/15</a:t>
+              <a:t>11/6/15</a:t>
             </a:fld>
             <a:endParaRPr lang="en-US"/>
           </a:p>
@@ -2268,7 +2268,7 @@
           <a:p>
             <a:fld id="{D9FE38A3-3E9D-3844-8113-0F0F6CE61532}" type="datetimeFigureOut">
               <a:rPr lang="en-US" smtClean="0"/>
-              <a:t>10/22/15</a:t>
+              <a:t>11/6/15</a:t>
             </a:fld>
             <a:endParaRPr lang="en-US"/>
           </a:p>
@@ -2521,7 +2521,7 @@
           <a:p>
             <a:fld id="{D9FE38A3-3E9D-3844-8113-0F0F6CE61532}" type="datetimeFigureOut">
               <a:rPr lang="en-US" smtClean="0"/>
-              <a:t>10/22/15</a:t>
+              <a:t>11/6/15</a:t>
             </a:fld>
             <a:endParaRPr lang="en-US"/>
           </a:p>
@@ -2734,7 +2734,7 @@
           <a:p>
             <a:fld id="{D9FE38A3-3E9D-3844-8113-0F0F6CE61532}" type="datetimeFigureOut">
               <a:rPr lang="en-US" smtClean="0"/>
-              <a:t>10/22/15</a:t>
+              <a:t>11/6/15</a:t>
             </a:fld>
             <a:endParaRPr lang="en-US"/>
           </a:p>
@@ -3128,7 +3128,15 @@
           <a:p>
             <a:r>
               <a:rPr lang="en-US" dirty="0" smtClean="0"/>
-              <a:t>Automatically select the data aggregation window and encoders</a:t>
+              <a:t>Select </a:t>
+            </a:r>
+            <a:r>
+              <a:rPr lang="en-US" dirty="0" smtClean="0"/>
+              <a:t>the data aggregation window and </a:t>
+            </a:r>
+            <a:r>
+              <a:rPr lang="en-US" dirty="0" smtClean="0"/>
+              <a:t>encoders automatically</a:t>
             </a:r>
             <a:endParaRPr lang="en-US" dirty="0"/>
           </a:p>
@@ -3156,7 +3164,19 @@
           <a:p>
             <a:r>
               <a:rPr lang="en-US" dirty="0" smtClean="0"/>
-              <a:t>October 23, 2015</a:t>
+              <a:t>Nov </a:t>
+            </a:r>
+            <a:r>
+              <a:rPr lang="en-US" dirty="0"/>
+              <a:t>6</a:t>
+            </a:r>
+            <a:r>
+              <a:rPr lang="en-US" dirty="0" smtClean="0"/>
+              <a:t>, </a:t>
+            </a:r>
+            <a:r>
+              <a:rPr lang="en-US" dirty="0" smtClean="0"/>
+              <a:t>2015</a:t>
             </a:r>
             <a:endParaRPr lang="en-US" dirty="0"/>
           </a:p>
@@ -3211,12 +3231,22 @@
         </p:nvSpPr>
         <p:spPr/>
         <p:txBody>
-          <a:bodyPr/>
+          <a:bodyPr>
+            <a:normAutofit fontScale="90000"/>
+          </a:bodyPr>
           <a:lstStyle/>
           <a:p>
             <a:r>
               <a:rPr lang="en-US" dirty="0" smtClean="0"/>
-              <a:t>Summary of the algorithm</a:t>
+              <a:t>The algorithm makes proper suggestion for </a:t>
+            </a:r>
+            <a:r>
+              <a:rPr lang="en-US" dirty="0" err="1" smtClean="0"/>
+              <a:t>timeOfDay</a:t>
+            </a:r>
+            <a:r>
+              <a:rPr lang="en-US" dirty="0" smtClean="0"/>
+              <a:t> encoder</a:t>
             </a:r>
             <a:endParaRPr lang="en-US" dirty="0"/>
           </a:p>
@@ -3224,98 +3254,696 @@
       </p:sp>
       <p:sp>
         <p:nvSpPr>
-          <p:cNvPr id="4" name="Content Placeholder 2"/>
-          <p:cNvSpPr>
-            <a:spLocks noGrp="1"/>
-          </p:cNvSpPr>
-          <p:nvPr>
-            <p:ph idx="1"/>
-          </p:nvPr>
+          <p:cNvPr id="5" name="TextBox 4"/>
+          <p:cNvSpPr txBox="1"/>
+          <p:nvPr/>
         </p:nvSpPr>
         <p:spPr>
           <a:xfrm>
-            <a:off x="457200" y="1600200"/>
-            <a:ext cx="8229600" cy="4525963"/>
+            <a:off x="457200" y="1851294"/>
+            <a:ext cx="3425111" cy="1200329"/>
           </a:xfrm>
+          <a:prstGeom prst="rect">
+            <a:avLst/>
+          </a:prstGeom>
+          <a:noFill/>
         </p:spPr>
         <p:txBody>
-          <a:bodyPr>
-            <a:normAutofit/>
+          <a:bodyPr wrap="square" rtlCol="0">
+            <a:spAutoFit/>
           </a:bodyPr>
           <a:lstStyle/>
           <a:p>
             <a:r>
-              <a:rPr lang="en-US" sz="2800" dirty="0"/>
-              <a:t>W</a:t>
-            </a:r>
-            <a:r>
-              <a:rPr lang="en-US" sz="2800" dirty="0" smtClean="0"/>
-              <a:t>avelet transformation of the signal at the original sampling interval (dt0)</a:t>
-            </a:r>
-          </a:p>
-          <a:p>
-            <a:r>
-              <a:rPr lang="en-US" sz="2800" dirty="0" smtClean="0"/>
-              <a:t>Calculate variance of the wavelet </a:t>
-            </a:r>
-            <a:r>
-              <a:rPr lang="en-US" sz="2800" dirty="0" err="1" smtClean="0"/>
-              <a:t>coeff</a:t>
-            </a:r>
-            <a:r>
-              <a:rPr lang="en-US" sz="2800" dirty="0" smtClean="0"/>
-              <a:t> at each frequency band (time scale)</a:t>
-            </a:r>
-          </a:p>
-          <a:p>
-            <a:r>
-              <a:rPr lang="en-US" sz="2800" dirty="0" smtClean="0"/>
-              <a:t>Apply a threshold to the cumulative distribution of wavelet </a:t>
-            </a:r>
-            <a:r>
-              <a:rPr lang="en-US" sz="2800" dirty="0" err="1" smtClean="0"/>
-              <a:t>coeff</a:t>
-            </a:r>
-            <a:r>
-              <a:rPr lang="en-US" sz="2800" dirty="0" smtClean="0"/>
-              <a:t>. variance, find the corresponding time scale at the threshold (</a:t>
-            </a:r>
-            <a:r>
-              <a:rPr lang="en-US" sz="2800" dirty="0" err="1" smtClean="0"/>
-              <a:t>dt</a:t>
-            </a:r>
-            <a:r>
-              <a:rPr lang="en-US" sz="2800" dirty="0" smtClean="0"/>
-              <a:t>)</a:t>
-            </a:r>
-          </a:p>
-          <a:p>
-            <a:r>
-              <a:rPr lang="en-US" sz="2800" dirty="0" smtClean="0"/>
-              <a:t>The suggested aggregation time scale is chosen as max(dt0, </a:t>
-            </a:r>
-            <a:r>
-              <a:rPr lang="en-US" sz="2800" dirty="0" err="1" smtClean="0"/>
-              <a:t>dt</a:t>
-            </a:r>
-            <a:r>
-              <a:rPr lang="en-US" sz="2800" dirty="0" smtClean="0"/>
-              <a:t>/10)</a:t>
-            </a:r>
-            <a:endParaRPr lang="en-US" sz="2800" dirty="0"/>
-          </a:p>
-        </p:txBody>
-      </p:sp>
+              <a:rPr lang="en-US" dirty="0" smtClean="0"/>
+              <a:t>If we naively include </a:t>
+            </a:r>
+            <a:r>
+              <a:rPr lang="en-US" dirty="0" err="1" smtClean="0"/>
+              <a:t>timeOfDay</a:t>
+            </a:r>
+            <a:r>
+              <a:rPr lang="en-US" dirty="0" smtClean="0"/>
+              <a:t> </a:t>
+            </a:r>
+          </a:p>
+          <a:p>
+            <a:r>
+              <a:rPr lang="en-US" dirty="0" smtClean="0"/>
+              <a:t>encoder for all datasets, the encoder will lead to worse NAB score in about half of the datasets</a:t>
+            </a:r>
+          </a:p>
+        </p:txBody>
+      </p:sp>
+      <p:sp>
+        <p:nvSpPr>
+          <p:cNvPr id="6" name="TextBox 5"/>
+          <p:cNvSpPr txBox="1"/>
+          <p:nvPr/>
+        </p:nvSpPr>
+        <p:spPr>
+          <a:xfrm>
+            <a:off x="457200" y="3971410"/>
+            <a:ext cx="3949556" cy="646331"/>
+          </a:xfrm>
+          <a:prstGeom prst="rect">
+            <a:avLst/>
+          </a:prstGeom>
+          <a:noFill/>
+        </p:spPr>
+        <p:txBody>
+          <a:bodyPr wrap="none" rtlCol="0">
+            <a:spAutoFit/>
+          </a:bodyPr>
+          <a:lstStyle/>
+          <a:p>
+            <a:r>
+              <a:rPr lang="en-US" dirty="0" smtClean="0"/>
+              <a:t>The algorithm suggest to use </a:t>
+            </a:r>
+            <a:r>
+              <a:rPr lang="en-US" dirty="0" err="1" smtClean="0"/>
+              <a:t>timeOfDay</a:t>
+            </a:r>
+            <a:endParaRPr lang="en-US" dirty="0" smtClean="0"/>
+          </a:p>
+          <a:p>
+            <a:r>
+              <a:rPr lang="en-US" dirty="0"/>
+              <a:t>e</a:t>
+            </a:r>
+            <a:r>
+              <a:rPr lang="en-US" dirty="0" smtClean="0"/>
+              <a:t>ncoder for  39/58 datasets</a:t>
+            </a:r>
+            <a:endParaRPr lang="en-US" dirty="0"/>
+          </a:p>
+        </p:txBody>
+      </p:sp>
+      <p:sp>
+        <p:nvSpPr>
+          <p:cNvPr id="7" name="TextBox 6"/>
+          <p:cNvSpPr txBox="1"/>
+          <p:nvPr/>
+        </p:nvSpPr>
+        <p:spPr>
+          <a:xfrm>
+            <a:off x="457200" y="5185571"/>
+            <a:ext cx="3425111" cy="923330"/>
+          </a:xfrm>
+          <a:prstGeom prst="rect">
+            <a:avLst/>
+          </a:prstGeom>
+          <a:noFill/>
+        </p:spPr>
+        <p:txBody>
+          <a:bodyPr wrap="none" rtlCol="0">
+            <a:spAutoFit/>
+          </a:bodyPr>
+          <a:lstStyle/>
+          <a:p>
+            <a:r>
+              <a:rPr lang="en-US" dirty="0" smtClean="0"/>
+              <a:t>False suggestion rate: 0.26 (15/58)</a:t>
+            </a:r>
+          </a:p>
+          <a:p>
+            <a:endParaRPr lang="en-US" dirty="0"/>
+          </a:p>
+          <a:p>
+            <a:r>
+              <a:rPr lang="en-US" dirty="0" smtClean="0"/>
+              <a:t>Raw NAB score: 0.130 -&gt; 0.183</a:t>
+            </a:r>
+            <a:endParaRPr lang="en-US" dirty="0"/>
+          </a:p>
+        </p:txBody>
+      </p:sp>
+      <p:pic>
+        <p:nvPicPr>
+          <p:cNvPr id="8" name="Picture 7" descr="experimentWithTimeOfDayEncoder_NABsummary.pdf"/>
+          <p:cNvPicPr>
+            <a:picLocks noChangeAspect="1"/>
+          </p:cNvPicPr>
+          <p:nvPr/>
+        </p:nvPicPr>
+        <p:blipFill>
+          <a:blip r:embed="rId2">
+            <a:extLst>
+              <a:ext uri="{28A0092B-C50C-407E-A947-70E740481C1C}">
+                <a14:useLocalDpi xmlns:a14="http://schemas.microsoft.com/office/drawing/2010/main" val="0"/>
+              </a:ext>
+            </a:extLst>
+          </a:blip>
+          <a:stretch>
+            <a:fillRect/>
+          </a:stretch>
+        </p:blipFill>
+        <p:spPr>
+          <a:xfrm>
+            <a:off x="4658053" y="1498367"/>
+            <a:ext cx="3136825" cy="2352619"/>
+          </a:xfrm>
+          <a:prstGeom prst="rect">
+            <a:avLst/>
+          </a:prstGeom>
+        </p:spPr>
+      </p:pic>
+      <p:sp>
+        <p:nvSpPr>
+          <p:cNvPr id="17" name="Rectangle 16"/>
+          <p:cNvSpPr/>
+          <p:nvPr/>
+        </p:nvSpPr>
+        <p:spPr>
+          <a:xfrm>
+            <a:off x="6245461" y="1605086"/>
+            <a:ext cx="2074132" cy="642465"/>
+          </a:xfrm>
+          <a:prstGeom prst="rect">
+            <a:avLst/>
+          </a:prstGeom>
+          <a:solidFill>
+            <a:schemeClr val="bg1"/>
+          </a:solidFill>
+          <a:ln>
+            <a:noFill/>
+          </a:ln>
+          <a:effectLst/>
+        </p:spPr>
+        <p:style>
+          <a:lnRef idx="1">
+            <a:schemeClr val="accent1"/>
+          </a:lnRef>
+          <a:fillRef idx="3">
+            <a:schemeClr val="accent1"/>
+          </a:fillRef>
+          <a:effectRef idx="2">
+            <a:schemeClr val="accent1"/>
+          </a:effectRef>
+          <a:fontRef idx="minor">
+            <a:schemeClr val="lt1"/>
+          </a:fontRef>
+        </p:style>
+        <p:txBody>
+          <a:bodyPr rtlCol="0" anchor="ctr"/>
+          <a:lstStyle/>
+          <a:p>
+            <a:pPr algn="ctr"/>
+            <a:endParaRPr lang="en-US"/>
+          </a:p>
+        </p:txBody>
+      </p:sp>
+      <p:pic>
+        <p:nvPicPr>
+          <p:cNvPr id="15" name="Picture 14" descr="experimentWithTimeOfDayEncoder_accuracy.pdf"/>
+          <p:cNvPicPr>
+            <a:picLocks noChangeAspect="1"/>
+          </p:cNvPicPr>
+          <p:nvPr/>
+        </p:nvPicPr>
+        <p:blipFill rotWithShape="1">
+          <a:blip r:embed="rId3">
+            <a:extLst>
+              <a:ext uri="{28A0092B-C50C-407E-A947-70E740481C1C}">
+                <a14:useLocalDpi xmlns:a14="http://schemas.microsoft.com/office/drawing/2010/main" val="0"/>
+              </a:ext>
+            </a:extLst>
+          </a:blip>
+          <a:srcRect l="37587" t="11182" r="18257" b="73603"/>
+          <a:stretch/>
+        </p:blipFill>
+        <p:spPr>
+          <a:xfrm>
+            <a:off x="6505650" y="3021860"/>
+            <a:ext cx="1891389" cy="488796"/>
+          </a:xfrm>
+          <a:prstGeom prst="rect">
+            <a:avLst/>
+          </a:prstGeom>
+        </p:spPr>
+      </p:pic>
+      <p:grpSp>
+        <p:nvGrpSpPr>
+          <p:cNvPr id="25" name="Group 24"/>
+          <p:cNvGrpSpPr/>
+          <p:nvPr/>
+        </p:nvGrpSpPr>
+        <p:grpSpPr>
+          <a:xfrm>
+            <a:off x="4658053" y="3645418"/>
+            <a:ext cx="4283443" cy="3212582"/>
+            <a:chOff x="4658053" y="3645418"/>
+            <a:chExt cx="4283443" cy="3212582"/>
+          </a:xfrm>
+        </p:grpSpPr>
+        <p:pic>
+          <p:nvPicPr>
+            <p:cNvPr id="9" name="Picture 8" descr="experimentWithTimeOfDayEncoder_accuracy.pdf"/>
+            <p:cNvPicPr>
+              <a:picLocks noChangeAspect="1"/>
+            </p:cNvPicPr>
+            <p:nvPr/>
+          </p:nvPicPr>
+          <p:blipFill>
+            <a:blip r:embed="rId3">
+              <a:extLst>
+                <a:ext uri="{28A0092B-C50C-407E-A947-70E740481C1C}">
+                  <a14:useLocalDpi xmlns:a14="http://schemas.microsoft.com/office/drawing/2010/main" val="0"/>
+                </a:ext>
+              </a:extLst>
+            </a:blip>
+            <a:stretch>
+              <a:fillRect/>
+            </a:stretch>
+          </p:blipFill>
+          <p:spPr>
+            <a:xfrm>
+              <a:off x="4658053" y="3645418"/>
+              <a:ext cx="4283443" cy="3212582"/>
+            </a:xfrm>
+            <a:prstGeom prst="rect">
+              <a:avLst/>
+            </a:prstGeom>
+          </p:spPr>
+        </p:pic>
+        <p:cxnSp>
+          <p:nvCxnSpPr>
+            <p:cNvPr id="11" name="Straight Arrow Connector 10"/>
+            <p:cNvCxnSpPr/>
+            <p:nvPr/>
+          </p:nvCxnSpPr>
+          <p:spPr>
+            <a:xfrm flipH="1">
+              <a:off x="6368592" y="5037449"/>
+              <a:ext cx="338074" cy="270791"/>
+            </a:xfrm>
+            <a:prstGeom prst="straightConnector1">
+              <a:avLst/>
+            </a:prstGeom>
+            <a:ln>
+              <a:tailEnd type="arrow"/>
+            </a:ln>
+          </p:spPr>
+          <p:style>
+            <a:lnRef idx="2">
+              <a:schemeClr val="accent1"/>
+            </a:lnRef>
+            <a:fillRef idx="0">
+              <a:schemeClr val="accent1"/>
+            </a:fillRef>
+            <a:effectRef idx="1">
+              <a:schemeClr val="accent1"/>
+            </a:effectRef>
+            <a:fontRef idx="minor">
+              <a:schemeClr val="tx1"/>
+            </a:fontRef>
+          </p:style>
+        </p:cxnSp>
+        <p:cxnSp>
+          <p:nvCxnSpPr>
+            <p:cNvPr id="13" name="Straight Arrow Connector 12"/>
+            <p:cNvCxnSpPr/>
+            <p:nvPr/>
+          </p:nvCxnSpPr>
+          <p:spPr>
+            <a:xfrm>
+              <a:off x="6825449" y="5037449"/>
+              <a:ext cx="511680" cy="1038248"/>
+            </a:xfrm>
+            <a:prstGeom prst="straightConnector1">
+              <a:avLst/>
+            </a:prstGeom>
+            <a:ln>
+              <a:tailEnd type="arrow"/>
+            </a:ln>
+          </p:spPr>
+          <p:style>
+            <a:lnRef idx="2">
+              <a:schemeClr val="accent1"/>
+            </a:lnRef>
+            <a:fillRef idx="0">
+              <a:schemeClr val="accent1"/>
+            </a:fillRef>
+            <a:effectRef idx="1">
+              <a:schemeClr val="accent1"/>
+            </a:effectRef>
+            <a:fontRef idx="minor">
+              <a:schemeClr val="tx1"/>
+            </a:fontRef>
+          </p:style>
+        </p:cxnSp>
+        <p:sp>
+          <p:nvSpPr>
+            <p:cNvPr id="14" name="TextBox 13"/>
+            <p:cNvSpPr txBox="1"/>
+            <p:nvPr/>
+          </p:nvSpPr>
+          <p:spPr>
+            <a:xfrm>
+              <a:off x="6056539" y="4713223"/>
+              <a:ext cx="1355597" cy="307777"/>
+            </a:xfrm>
+            <a:prstGeom prst="rect">
+              <a:avLst/>
+            </a:prstGeom>
+            <a:noFill/>
+          </p:spPr>
+          <p:txBody>
+            <a:bodyPr wrap="none" rtlCol="0">
+              <a:spAutoFit/>
+            </a:bodyPr>
+            <a:lstStyle/>
+            <a:p>
+              <a:r>
+                <a:rPr lang="en-US" sz="1400" dirty="0" smtClean="0"/>
+                <a:t>Bad suggestions</a:t>
+              </a:r>
+              <a:endParaRPr lang="en-US" sz="1400" dirty="0"/>
+            </a:p>
+          </p:txBody>
+        </p:sp>
+        <p:sp>
+          <p:nvSpPr>
+            <p:cNvPr id="16" name="Rectangle 15"/>
+            <p:cNvSpPr/>
+            <p:nvPr/>
+          </p:nvSpPr>
+          <p:spPr>
+            <a:xfrm>
+              <a:off x="6194986" y="3971410"/>
+              <a:ext cx="2074132" cy="642465"/>
+            </a:xfrm>
+            <a:prstGeom prst="rect">
+              <a:avLst/>
+            </a:prstGeom>
+            <a:solidFill>
+              <a:schemeClr val="bg1"/>
+            </a:solidFill>
+            <a:ln>
+              <a:noFill/>
+            </a:ln>
+            <a:effectLst/>
+          </p:spPr>
+          <p:style>
+            <a:lnRef idx="1">
+              <a:schemeClr val="accent1"/>
+            </a:lnRef>
+            <a:fillRef idx="3">
+              <a:schemeClr val="accent1"/>
+            </a:fillRef>
+            <a:effectRef idx="2">
+              <a:schemeClr val="accent1"/>
+            </a:effectRef>
+            <a:fontRef idx="minor">
+              <a:schemeClr val="lt1"/>
+            </a:fontRef>
+          </p:style>
+          <p:txBody>
+            <a:bodyPr rtlCol="0" anchor="ctr"/>
+            <a:lstStyle/>
+            <a:p>
+              <a:pPr algn="ctr"/>
+              <a:endParaRPr lang="en-US"/>
+            </a:p>
+          </p:txBody>
+        </p:sp>
+        <p:sp>
+          <p:nvSpPr>
+            <p:cNvPr id="18" name="TextBox 17"/>
+            <p:cNvSpPr txBox="1"/>
+            <p:nvPr/>
+          </p:nvSpPr>
+          <p:spPr>
+            <a:xfrm>
+              <a:off x="6245461" y="3971410"/>
+              <a:ext cx="1474557" cy="307777"/>
+            </a:xfrm>
+            <a:prstGeom prst="rect">
+              <a:avLst/>
+            </a:prstGeom>
+            <a:noFill/>
+          </p:spPr>
+          <p:txBody>
+            <a:bodyPr wrap="none" rtlCol="0">
+              <a:spAutoFit/>
+            </a:bodyPr>
+            <a:lstStyle/>
+            <a:p>
+              <a:r>
+                <a:rPr lang="en-US" sz="1400" dirty="0" smtClean="0"/>
+                <a:t>Good suggestions</a:t>
+              </a:r>
+              <a:endParaRPr lang="en-US" sz="1400" dirty="0"/>
+            </a:p>
+          </p:txBody>
+        </p:sp>
+        <p:cxnSp>
+          <p:nvCxnSpPr>
+            <p:cNvPr id="19" name="Straight Arrow Connector 18"/>
+            <p:cNvCxnSpPr/>
+            <p:nvPr/>
+          </p:nvCxnSpPr>
+          <p:spPr>
+            <a:xfrm flipH="1">
+              <a:off x="5610208" y="4279187"/>
+              <a:ext cx="895442" cy="741813"/>
+            </a:xfrm>
+            <a:prstGeom prst="straightConnector1">
+              <a:avLst/>
+            </a:prstGeom>
+            <a:ln>
+              <a:tailEnd type="arrow"/>
+            </a:ln>
+          </p:spPr>
+          <p:style>
+            <a:lnRef idx="2">
+              <a:schemeClr val="accent1"/>
+            </a:lnRef>
+            <a:fillRef idx="0">
+              <a:schemeClr val="accent1"/>
+            </a:fillRef>
+            <a:effectRef idx="1">
+              <a:schemeClr val="accent1"/>
+            </a:effectRef>
+            <a:fontRef idx="minor">
+              <a:schemeClr val="tx1"/>
+            </a:fontRef>
+          </p:style>
+        </p:cxnSp>
+        <p:cxnSp>
+          <p:nvCxnSpPr>
+            <p:cNvPr id="22" name="Straight Arrow Connector 21"/>
+            <p:cNvCxnSpPr/>
+            <p:nvPr/>
+          </p:nvCxnSpPr>
+          <p:spPr>
+            <a:xfrm>
+              <a:off x="7126975" y="4242643"/>
+              <a:ext cx="1002154" cy="1127594"/>
+            </a:xfrm>
+            <a:prstGeom prst="straightConnector1">
+              <a:avLst/>
+            </a:prstGeom>
+            <a:ln>
+              <a:tailEnd type="arrow"/>
+            </a:ln>
+          </p:spPr>
+          <p:style>
+            <a:lnRef idx="2">
+              <a:schemeClr val="accent1"/>
+            </a:lnRef>
+            <a:fillRef idx="0">
+              <a:schemeClr val="accent1"/>
+            </a:fillRef>
+            <a:effectRef idx="1">
+              <a:schemeClr val="accent1"/>
+            </a:effectRef>
+            <a:fontRef idx="minor">
+              <a:schemeClr val="tx1"/>
+            </a:fontRef>
+          </p:style>
+        </p:cxnSp>
+      </p:grpSp>
     </p:spTree>
     <p:extLst>
       <p:ext uri="{BB962C8B-B14F-4D97-AF65-F5344CB8AC3E}">
-        <p14:creationId xmlns:p14="http://schemas.microsoft.com/office/powerpoint/2010/main" val="437226795"/>
+        <p14:creationId xmlns:p14="http://schemas.microsoft.com/office/powerpoint/2010/main" val="1401075096"/>
       </p:ext>
     </p:extLst>
   </p:cSld>
   <p:clrMapOvr>
     <a:masterClrMapping/>
   </p:clrMapOvr>
+  <p:timing>
+    <p:tnLst>
+      <p:par>
+        <p:cTn xmlns:p14="http://schemas.microsoft.com/office/powerpoint/2010/main" id="1" dur="indefinite" restart="never" nodeType="tmRoot">
+          <p:childTnLst>
+            <p:seq concurrent="1" nextAc="seek">
+              <p:cTn id="2" dur="indefinite" nodeType="mainSeq">
+                <p:childTnLst>
+                  <p:par>
+                    <p:cTn id="3" fill="hold">
+                      <p:stCondLst>
+                        <p:cond delay="indefinite"/>
+                      </p:stCondLst>
+                      <p:childTnLst>
+                        <p:par>
+                          <p:cTn id="4" fill="hold">
+                            <p:stCondLst>
+                              <p:cond delay="0"/>
+                            </p:stCondLst>
+                            <p:childTnLst>
+                              <p:par>
+                                <p:cTn id="5" presetID="1" presetClass="entr" presetSubtype="0" fill="hold" grpId="0" nodeType="clickEffect">
+                                  <p:stCondLst>
+                                    <p:cond delay="0"/>
+                                  </p:stCondLst>
+                                  <p:childTnLst>
+                                    <p:set>
+                                      <p:cBhvr>
+                                        <p:cTn id="6" dur="1" fill="hold">
+                                          <p:stCondLst>
+                                            <p:cond delay="0"/>
+                                          </p:stCondLst>
+                                        </p:cTn>
+                                        <p:tgtEl>
+                                          <p:spTgt spid="6"/>
+                                        </p:tgtEl>
+                                        <p:attrNameLst>
+                                          <p:attrName>style.visibility</p:attrName>
+                                        </p:attrNameLst>
+                                      </p:cBhvr>
+                                      <p:to>
+                                        <p:strVal val="visible"/>
+                                      </p:to>
+                                    </p:set>
+                                  </p:childTnLst>
+                                </p:cTn>
+                              </p:par>
+                            </p:childTnLst>
+                          </p:cTn>
+                        </p:par>
+                      </p:childTnLst>
+                    </p:cTn>
+                  </p:par>
+                  <p:par>
+                    <p:cTn id="7" fill="hold">
+                      <p:stCondLst>
+                        <p:cond delay="indefinite"/>
+                      </p:stCondLst>
+                      <p:childTnLst>
+                        <p:par>
+                          <p:cTn id="8" fill="hold">
+                            <p:stCondLst>
+                              <p:cond delay="0"/>
+                            </p:stCondLst>
+                            <p:childTnLst>
+                              <p:par>
+                                <p:cTn id="9" presetID="1" presetClass="entr" presetSubtype="0" fill="hold" nodeType="clickEffect">
+                                  <p:stCondLst>
+                                    <p:cond delay="0"/>
+                                  </p:stCondLst>
+                                  <p:childTnLst>
+                                    <p:set>
+                                      <p:cBhvr>
+                                        <p:cTn id="10" dur="1" fill="hold">
+                                          <p:stCondLst>
+                                            <p:cond delay="0"/>
+                                          </p:stCondLst>
+                                        </p:cTn>
+                                        <p:tgtEl>
+                                          <p:spTgt spid="25"/>
+                                        </p:tgtEl>
+                                        <p:attrNameLst>
+                                          <p:attrName>style.visibility</p:attrName>
+                                        </p:attrNameLst>
+                                      </p:cBhvr>
+                                      <p:to>
+                                        <p:strVal val="visible"/>
+                                      </p:to>
+                                    </p:set>
+                                  </p:childTnLst>
+                                </p:cTn>
+                              </p:par>
+                            </p:childTnLst>
+                          </p:cTn>
+                        </p:par>
+                      </p:childTnLst>
+                    </p:cTn>
+                  </p:par>
+                  <p:par>
+                    <p:cTn id="11" fill="hold">
+                      <p:stCondLst>
+                        <p:cond delay="indefinite"/>
+                      </p:stCondLst>
+                      <p:childTnLst>
+                        <p:par>
+                          <p:cTn id="12" fill="hold">
+                            <p:stCondLst>
+                              <p:cond delay="0"/>
+                            </p:stCondLst>
+                            <p:childTnLst>
+                              <p:par>
+                                <p:cTn id="13" presetID="1" presetClass="entr" presetSubtype="0" fill="hold" grpId="0" nodeType="clickEffect">
+                                  <p:stCondLst>
+                                    <p:cond delay="0"/>
+                                  </p:stCondLst>
+                                  <p:childTnLst>
+                                    <p:set>
+                                      <p:cBhvr>
+                                        <p:cTn id="14" dur="1" fill="hold">
+                                          <p:stCondLst>
+                                            <p:cond delay="0"/>
+                                          </p:stCondLst>
+                                        </p:cTn>
+                                        <p:tgtEl>
+                                          <p:spTgt spid="7"/>
+                                        </p:tgtEl>
+                                        <p:attrNameLst>
+                                          <p:attrName>style.visibility</p:attrName>
+                                        </p:attrNameLst>
+                                      </p:cBhvr>
+                                      <p:to>
+                                        <p:strVal val="visible"/>
+                                      </p:to>
+                                    </p:set>
+                                  </p:childTnLst>
+                                </p:cTn>
+                              </p:par>
+                            </p:childTnLst>
+                          </p:cTn>
+                        </p:par>
+                      </p:childTnLst>
+                    </p:cTn>
+                  </p:par>
+                </p:childTnLst>
+              </p:cTn>
+              <p:prevCondLst>
+                <p:cond evt="onPrev" delay="0">
+                  <p:tgtEl>
+                    <p:sldTgt/>
+                  </p:tgtEl>
+                </p:cond>
+              </p:prevCondLst>
+              <p:nextCondLst>
+                <p:cond evt="onNext" delay="0">
+                  <p:tgtEl>
+                    <p:sldTgt/>
+                  </p:tgtEl>
+                </p:cond>
+              </p:nextCondLst>
+            </p:seq>
+          </p:childTnLst>
+        </p:cTn>
+      </p:par>
+    </p:tnLst>
+    <p:bldLst>
+      <p:bldP spid="6" grpId="0"/>
+      <p:bldP spid="7" grpId="0"/>
+    </p:bldLst>
+  </p:timing>
 </p:sld>
 </file>
 
@@ -3351,81 +3979,33 @@
           <a:bodyPr/>
           <a:lstStyle/>
           <a:p>
-            <a:r>
-              <a:rPr lang="en-US" dirty="0" smtClean="0"/>
-              <a:t>How to choose the threshold?</a:t>
-            </a:r>
-            <a:endParaRPr lang="en-US" dirty="0"/>
-          </a:p>
-        </p:txBody>
-      </p:sp>
-      <p:pic>
-        <p:nvPicPr>
-          <p:cNvPr id="4" name="Picture 3" descr="AnomalyScore_Vs_AggregationThreshold.pdf"/>
-          <p:cNvPicPr>
-            <a:picLocks noChangeAspect="1"/>
-          </p:cNvPicPr>
-          <p:nvPr/>
-        </p:nvPicPr>
-        <p:blipFill>
-          <a:blip r:embed="rId2">
-            <a:extLst>
-              <a:ext uri="{28A0092B-C50C-407E-A947-70E740481C1C}">
-                <a14:useLocalDpi xmlns:a14="http://schemas.microsoft.com/office/drawing/2010/main" val="0"/>
-              </a:ext>
-            </a:extLst>
-          </a:blip>
-          <a:stretch>
-            <a:fillRect/>
-          </a:stretch>
-        </p:blipFill>
-        <p:spPr>
-          <a:xfrm>
-            <a:off x="1032933" y="1219200"/>
-            <a:ext cx="7315200" cy="5486400"/>
-          </a:xfrm>
-          <a:prstGeom prst="rect">
-            <a:avLst/>
-          </a:prstGeom>
-        </p:spPr>
-      </p:pic>
-      <p:cxnSp>
-        <p:nvCxnSpPr>
-          <p:cNvPr id="6" name="Straight Connector 5"/>
-          <p:cNvCxnSpPr/>
-          <p:nvPr/>
-        </p:nvCxnSpPr>
-        <p:spPr>
-          <a:xfrm>
-            <a:off x="4762257" y="1718001"/>
-            <a:ext cx="56026" cy="4463069"/>
-          </a:xfrm>
-          <a:prstGeom prst="line">
-            <a:avLst/>
-          </a:prstGeom>
-          <a:ln>
-            <a:prstDash val="sysDash"/>
-          </a:ln>
-        </p:spPr>
-        <p:style>
-          <a:lnRef idx="2">
-            <a:schemeClr val="accent1"/>
-          </a:lnRef>
-          <a:fillRef idx="0">
-            <a:schemeClr val="accent1"/>
-          </a:fillRef>
-          <a:effectRef idx="1">
-            <a:schemeClr val="accent1"/>
-          </a:effectRef>
-          <a:fontRef idx="minor">
-            <a:schemeClr val="tx1"/>
-          </a:fontRef>
-        </p:style>
-      </p:cxnSp>
+            <a:endParaRPr lang="en-US"/>
+          </a:p>
+        </p:txBody>
+      </p:sp>
+      <p:sp>
+        <p:nvSpPr>
+          <p:cNvPr id="3" name="Content Placeholder 2"/>
+          <p:cNvSpPr>
+            <a:spLocks noGrp="1"/>
+          </p:cNvSpPr>
+          <p:nvPr>
+            <p:ph idx="1"/>
+          </p:nvPr>
+        </p:nvSpPr>
+        <p:spPr/>
+        <p:txBody>
+          <a:bodyPr/>
+          <a:lstStyle/>
+          <a:p>
+            <a:endParaRPr lang="en-US"/>
+          </a:p>
+        </p:txBody>
+      </p:sp>
     </p:spTree>
     <p:extLst>
       <p:ext uri="{BB962C8B-B14F-4D97-AF65-F5344CB8AC3E}">
-        <p14:creationId xmlns:p14="http://schemas.microsoft.com/office/powerpoint/2010/main" val="2317762285"/>
+        <p14:creationId xmlns:p14="http://schemas.microsoft.com/office/powerpoint/2010/main" val="1107088167"/>
       </p:ext>
     </p:extLst>
   </p:cSld>
@@ -4166,7 +4746,7 @@
           <a:p>
             <a:r>
               <a:rPr lang="en-US" dirty="0" smtClean="0"/>
-              <a:t>Goal</a:t>
+              <a:t>Goal and requirements</a:t>
             </a:r>
             <a:endParaRPr lang="en-US" dirty="0"/>
           </a:p>
@@ -4203,8 +4783,13 @@
             </a:pPr>
             <a:r>
               <a:rPr lang="en-US" sz="2800" dirty="0" smtClean="0"/>
-              <a:t>	Fast, without running the models</a:t>
-            </a:r>
+              <a:t>	Fast, without running the </a:t>
+            </a:r>
+            <a:r>
+              <a:rPr lang="en-US" sz="2800" dirty="0" smtClean="0"/>
+              <a:t>HTM models</a:t>
+            </a:r>
+            <a:endParaRPr lang="en-US" sz="2800" dirty="0" smtClean="0"/>
           </a:p>
           <a:p>
             <a:pPr marL="0" indent="0">
@@ -4221,7 +4806,15 @@
             </a:pPr>
             <a:r>
               <a:rPr lang="en-US" sz="2800" dirty="0" smtClean="0"/>
-              <a:t>	Do not hurt anomaly detection scores</a:t>
+              <a:t>	</a:t>
+            </a:r>
+            <a:r>
+              <a:rPr lang="en-US" sz="2800" dirty="0" smtClean="0"/>
+              <a:t>Must not </a:t>
+            </a:r>
+            <a:r>
+              <a:rPr lang="en-US" sz="2800" dirty="0" smtClean="0"/>
+              <a:t>hurt anomaly detection scores</a:t>
             </a:r>
           </a:p>
           <a:p>
@@ -4245,8 +4838,34 @@
             </a:pPr>
             <a:r>
               <a:rPr lang="en-US" sz="2800" dirty="0" smtClean="0"/>
-              <a:t>	e.g., should we use time of day or day of week encoder for this data?</a:t>
-            </a:r>
+              <a:t>	e.g., should we use time of day </a:t>
+            </a:r>
+            <a:r>
+              <a:rPr lang="en-US" sz="2800" dirty="0" smtClean="0"/>
+              <a:t>encoder </a:t>
+            </a:r>
+            <a:r>
+              <a:rPr lang="en-US" sz="2800" dirty="0" smtClean="0"/>
+              <a:t>for this data</a:t>
+            </a:r>
+            <a:r>
+              <a:rPr lang="en-US" sz="2800" dirty="0" smtClean="0"/>
+              <a:t>?</a:t>
+            </a:r>
+          </a:p>
+          <a:p>
+            <a:pPr marL="0" indent="0">
+              <a:buNone/>
+            </a:pPr>
+            <a:r>
+              <a:rPr lang="en-US" sz="2800" dirty="0"/>
+              <a:t>	</a:t>
+            </a:r>
+            <a:r>
+              <a:rPr lang="en-US" sz="2800" dirty="0" smtClean="0"/>
+              <a:t>Leads to better anomaly detection scores in general</a:t>
+            </a:r>
+            <a:endParaRPr lang="en-US" sz="2800" dirty="0" smtClean="0"/>
           </a:p>
           <a:p>
             <a:endParaRPr lang="en-US" sz="2800" dirty="0"/>
@@ -4263,6 +4882,13 @@
   <p:clrMapOvr>
     <a:masterClrMapping/>
   </p:clrMapOvr>
+  <p:timing>
+    <p:tnLst>
+      <p:par>
+        <p:cTn xmlns:p14="http://schemas.microsoft.com/office/powerpoint/2010/main" id="1" dur="indefinite" restart="never" nodeType="tmRoot"/>
+      </p:par>
+    </p:tnLst>
+  </p:timing>
 </p:sld>
 </file>
 
@@ -4300,7 +4926,7 @@
           <a:p>
             <a:r>
               <a:rPr lang="en-US" dirty="0" smtClean="0"/>
-              <a:t>Wavelet transformation</a:t>
+              <a:t>Rational of the algorithm</a:t>
             </a:r>
             <a:endParaRPr lang="en-US" dirty="0"/>
           </a:p>
@@ -4319,7 +4945,7 @@
         <p:spPr>
           <a:xfrm>
             <a:off x="457200" y="1600200"/>
-            <a:ext cx="8229600" cy="4394200"/>
+            <a:ext cx="8229600" cy="5257800"/>
           </a:xfrm>
         </p:spPr>
         <p:txBody>
@@ -4328,19 +4954,73 @@
           </a:bodyPr>
           <a:lstStyle/>
           <a:p>
-            <a:r>
-              <a:rPr lang="en-US" dirty="0" smtClean="0"/>
-              <a:t>Why transformation?</a:t>
-            </a:r>
-          </a:p>
-          <a:p>
             <a:pPr marL="0" indent="0">
               <a:buNone/>
             </a:pPr>
             <a:r>
+              <a:rPr lang="en-US" sz="2400" b="1" dirty="0" smtClean="0"/>
+              <a:t>Aggregation window</a:t>
+            </a:r>
+            <a:r>
               <a:rPr lang="en-US" sz="2400" dirty="0" smtClean="0"/>
-              <a:t>Mathematical transformations are applied to raw signals to obtain information that is not readily available in the raw signal</a:t>
-            </a:r>
+              <a:t>: </a:t>
+            </a:r>
+            <a:endParaRPr lang="en-US" sz="2400" dirty="0"/>
+          </a:p>
+          <a:p>
+            <a:r>
+              <a:rPr lang="en-US" sz="2400" dirty="0"/>
+              <a:t>Aggregation removes high-frequency (fast time scale) component from the signal</a:t>
+            </a:r>
+          </a:p>
+          <a:p>
+            <a:r>
+              <a:rPr lang="en-US" sz="2400" dirty="0"/>
+              <a:t>We could apply aggregation if there is little modulation </a:t>
+            </a:r>
+            <a:r>
+              <a:rPr lang="en-US" sz="2400" dirty="0" smtClean="0"/>
+              <a:t>of the </a:t>
+            </a:r>
+            <a:r>
+              <a:rPr lang="en-US" sz="2400" dirty="0"/>
+              <a:t>high-frequency power over time</a:t>
+            </a:r>
+            <a:r>
+              <a:rPr lang="en-US" sz="2400" dirty="0" smtClean="0"/>
+              <a:t>.</a:t>
+            </a:r>
+          </a:p>
+          <a:p>
+            <a:endParaRPr lang="en-US" sz="2400" dirty="0"/>
+          </a:p>
+          <a:p>
+            <a:pPr marL="0" indent="0">
+              <a:buNone/>
+            </a:pPr>
+            <a:r>
+              <a:rPr lang="en-US" sz="2400" b="1" dirty="0" smtClean="0"/>
+              <a:t>Encoder type</a:t>
+            </a:r>
+            <a:r>
+              <a:rPr lang="en-US" sz="2400" dirty="0" smtClean="0"/>
+              <a:t>:</a:t>
+            </a:r>
+          </a:p>
+          <a:p>
+            <a:r>
+              <a:rPr lang="en-US" sz="2400" dirty="0" smtClean="0"/>
+              <a:t>A clear modulation at the daily level suggest </a:t>
+            </a:r>
+            <a:r>
+              <a:rPr lang="en-US" sz="2400" dirty="0" err="1" smtClean="0"/>
+              <a:t>timeOfDay</a:t>
+            </a:r>
+            <a:r>
+              <a:rPr lang="en-US" sz="2400" dirty="0" smtClean="0"/>
+              <a:t> encoder could be useful</a:t>
+            </a:r>
+            <a:endParaRPr lang="en-US" sz="2400" dirty="0"/>
           </a:p>
           <a:p>
             <a:pPr marL="0" indent="0">
@@ -4354,27 +5034,31 @@
             </a:pPr>
             <a:r>
               <a:rPr lang="en-US" sz="2400" i="1" dirty="0" smtClean="0"/>
-              <a:t>Example</a:t>
-            </a:r>
-            <a:r>
-              <a:rPr lang="en-US" sz="2400" dirty="0" smtClean="0"/>
-              <a:t>: Fourier transform gives the frequency component of a signal (For every frequency, we have an amplitude value)</a:t>
-            </a:r>
+              <a:t>How </a:t>
+            </a:r>
+            <a:r>
+              <a:rPr lang="en-US" sz="2400" i="1" dirty="0"/>
+              <a:t>does the signal changes </a:t>
+            </a:r>
+            <a:r>
+              <a:rPr lang="en-US" sz="2400" i="1" dirty="0" smtClean="0"/>
+              <a:t>at </a:t>
+            </a:r>
+            <a:r>
+              <a:rPr lang="en-US" sz="2400" i="1" dirty="0"/>
+              <a:t>different time scales</a:t>
+            </a:r>
+            <a:r>
+              <a:rPr lang="en-US" sz="2400" i="1" dirty="0" smtClean="0"/>
+              <a:t>?</a:t>
+            </a:r>
+            <a:endParaRPr lang="en-US" sz="2400" i="1" dirty="0" smtClean="0"/>
           </a:p>
           <a:p>
             <a:pPr marL="0" indent="0">
               <a:buNone/>
             </a:pPr>
-            <a:endParaRPr lang="en-US" sz="2400" dirty="0" smtClean="0"/>
-          </a:p>
-          <a:p>
-            <a:pPr marL="0" indent="0">
-              <a:buNone/>
-            </a:pPr>
-            <a:r>
-              <a:rPr lang="en-US" sz="2400" dirty="0" smtClean="0"/>
-              <a:t>The wavelet transformation provides a time-frequency representation of a signal, i.e., we know how the signal changes over time at different time scales (frequency bands).</a:t>
-            </a:r>
+            <a:endParaRPr lang="en-US" sz="2400" dirty="0"/>
           </a:p>
         </p:txBody>
       </p:sp>
@@ -4388,6 +5072,13 @@
   <p:clrMapOvr>
     <a:masterClrMapping/>
   </p:clrMapOvr>
+  <p:timing>
+    <p:tnLst>
+      <p:par>
+        <p:cTn xmlns:p14="http://schemas.microsoft.com/office/powerpoint/2010/main" id="1" dur="indefinite" restart="never" nodeType="tmRoot"/>
+      </p:par>
+    </p:tnLst>
+  </p:timing>
 </p:sld>
 </file>
 
@@ -4425,7 +5116,11 @@
           <a:p>
             <a:r>
               <a:rPr lang="en-US" dirty="0" smtClean="0"/>
-              <a:t>Example wavelet transformation</a:t>
+              <a:t>Wavelet </a:t>
+            </a:r>
+            <a:r>
+              <a:rPr lang="en-US" dirty="0" smtClean="0"/>
+              <a:t>transformation</a:t>
             </a:r>
             <a:endParaRPr lang="en-US" dirty="0"/>
           </a:p>
@@ -4453,7 +5148,7 @@
         </p:blipFill>
         <p:spPr>
           <a:xfrm>
-            <a:off x="795866" y="1371600"/>
+            <a:off x="795866" y="1188872"/>
             <a:ext cx="7315200" cy="5486400"/>
           </a:xfrm>
           <a:prstGeom prst="rect">
@@ -4475,88 +5170,6 @@
 </file>
 
 <file path=ppt/slides/slide5.xml><?xml version="1.0" encoding="utf-8"?>
-<p:sld xmlns:a="http://schemas.openxmlformats.org/drawingml/2006/main" xmlns:r="http://schemas.openxmlformats.org/officeDocument/2006/relationships" xmlns:p="http://schemas.openxmlformats.org/presentationml/2006/main">
-  <p:cSld>
-    <p:spTree>
-      <p:nvGrpSpPr>
-        <p:cNvPr id="1" name=""/>
-        <p:cNvGrpSpPr/>
-        <p:nvPr/>
-      </p:nvGrpSpPr>
-      <p:grpSpPr>
-        <a:xfrm>
-          <a:off x="0" y="0"/>
-          <a:ext cx="0" cy="0"/>
-          <a:chOff x="0" y="0"/>
-          <a:chExt cx="0" cy="0"/>
-        </a:xfrm>
-      </p:grpSpPr>
-      <p:sp>
-        <p:nvSpPr>
-          <p:cNvPr id="2" name="Title 1"/>
-          <p:cNvSpPr>
-            <a:spLocks noGrp="1"/>
-          </p:cNvSpPr>
-          <p:nvPr>
-            <p:ph type="title"/>
-          </p:nvPr>
-        </p:nvSpPr>
-        <p:spPr/>
-        <p:txBody>
-          <a:bodyPr/>
-          <a:lstStyle/>
-          <a:p>
-            <a:r>
-              <a:rPr lang="en-US" dirty="0" smtClean="0"/>
-              <a:t>Selecting the aggregation window</a:t>
-            </a:r>
-            <a:endParaRPr lang="en-US" dirty="0"/>
-          </a:p>
-        </p:txBody>
-      </p:sp>
-      <p:sp>
-        <p:nvSpPr>
-          <p:cNvPr id="3" name="Content Placeholder 2"/>
-          <p:cNvSpPr>
-            <a:spLocks noGrp="1"/>
-          </p:cNvSpPr>
-          <p:nvPr>
-            <p:ph idx="1"/>
-          </p:nvPr>
-        </p:nvSpPr>
-        <p:spPr/>
-        <p:txBody>
-          <a:bodyPr/>
-          <a:lstStyle/>
-          <a:p>
-            <a:r>
-              <a:rPr lang="en-US" dirty="0" smtClean="0"/>
-              <a:t>Aggregation removes high-frequency (fast time scale) component from the signal</a:t>
-            </a:r>
-          </a:p>
-          <a:p>
-            <a:r>
-              <a:rPr lang="en-US" dirty="0" smtClean="0"/>
-              <a:t>We could apply aggregation if there is little modulation on the high-frequency power over time.</a:t>
-            </a:r>
-            <a:endParaRPr lang="en-US" dirty="0"/>
-          </a:p>
-        </p:txBody>
-      </p:sp>
-    </p:spTree>
-    <p:extLst>
-      <p:ext uri="{BB962C8B-B14F-4D97-AF65-F5344CB8AC3E}">
-        <p14:creationId xmlns:p14="http://schemas.microsoft.com/office/powerpoint/2010/main" val="2792516123"/>
-      </p:ext>
-    </p:extLst>
-  </p:cSld>
-  <p:clrMapOvr>
-    <a:masterClrMapping/>
-  </p:clrMapOvr>
-</p:sld>
-</file>
-
-<file path=ppt/slides/slide6.xml><?xml version="1.0" encoding="utf-8"?>
 <p:sld xmlns:a="http://schemas.openxmlformats.org/drawingml/2006/main" xmlns:r="http://schemas.openxmlformats.org/officeDocument/2006/relationships" xmlns:p="http://schemas.openxmlformats.org/presentationml/2006/main">
   <p:cSld>
     <p:spTree>
@@ -4912,7 +5525,7 @@
 </p:sld>
 </file>
 
-<file path=ppt/slides/slide7.xml><?xml version="1.0" encoding="utf-8"?>
+<file path=ppt/slides/slide6.xml><?xml version="1.0" encoding="utf-8"?>
 <p:sld xmlns:a="http://schemas.openxmlformats.org/drawingml/2006/main" xmlns:r="http://schemas.openxmlformats.org/officeDocument/2006/relationships" xmlns:p="http://schemas.openxmlformats.org/presentationml/2006/main">
   <p:cSld>
     <p:spTree>
@@ -4984,10 +5597,209 @@
           </a:prstGeom>
         </p:spPr>
       </p:pic>
+      <p:cxnSp>
+        <p:nvCxnSpPr>
+          <p:cNvPr id="5" name="Straight Arrow Connector 4"/>
+          <p:cNvCxnSpPr/>
+          <p:nvPr/>
+        </p:nvCxnSpPr>
+        <p:spPr>
+          <a:xfrm flipH="1" flipV="1">
+            <a:off x="6529295" y="2046941"/>
+            <a:ext cx="7471" cy="508000"/>
+          </a:xfrm>
+          <a:prstGeom prst="straightConnector1">
+            <a:avLst/>
+          </a:prstGeom>
+          <a:ln>
+            <a:tailEnd type="arrow"/>
+          </a:ln>
+        </p:spPr>
+        <p:style>
+          <a:lnRef idx="2">
+            <a:schemeClr val="accent1"/>
+          </a:lnRef>
+          <a:fillRef idx="0">
+            <a:schemeClr val="accent1"/>
+          </a:fillRef>
+          <a:effectRef idx="1">
+            <a:schemeClr val="accent1"/>
+          </a:effectRef>
+          <a:fontRef idx="minor">
+            <a:schemeClr val="tx1"/>
+          </a:fontRef>
+        </p:style>
+      </p:cxnSp>
+      <p:sp>
+        <p:nvSpPr>
+          <p:cNvPr id="6" name="TextBox 5"/>
+          <p:cNvSpPr txBox="1"/>
+          <p:nvPr/>
+        </p:nvSpPr>
+        <p:spPr>
+          <a:xfrm>
+            <a:off x="5759823" y="2585076"/>
+            <a:ext cx="1643530" cy="646331"/>
+          </a:xfrm>
+          <a:prstGeom prst="rect">
+            <a:avLst/>
+          </a:prstGeom>
+          <a:noFill/>
+        </p:spPr>
+        <p:txBody>
+          <a:bodyPr wrap="square" rtlCol="0">
+            <a:spAutoFit/>
+          </a:bodyPr>
+          <a:lstStyle/>
+          <a:p>
+            <a:r>
+              <a:rPr lang="en-US" dirty="0" smtClean="0"/>
+              <a:t>Strong peak at </a:t>
+            </a:r>
+          </a:p>
+          <a:p>
+            <a:r>
+              <a:rPr lang="en-US" dirty="0" smtClean="0"/>
+              <a:t>the daily level</a:t>
+            </a:r>
+            <a:endParaRPr lang="en-US" dirty="0"/>
+          </a:p>
+        </p:txBody>
+      </p:sp>
+      <p:sp>
+        <p:nvSpPr>
+          <p:cNvPr id="7" name="TextBox 6"/>
+          <p:cNvSpPr txBox="1"/>
+          <p:nvPr/>
+        </p:nvSpPr>
+        <p:spPr>
+          <a:xfrm>
+            <a:off x="1960281" y="3197664"/>
+            <a:ext cx="1991659" cy="646331"/>
+          </a:xfrm>
+          <a:prstGeom prst="rect">
+            <a:avLst/>
+          </a:prstGeom>
+          <a:noFill/>
+        </p:spPr>
+        <p:txBody>
+          <a:bodyPr wrap="square" rtlCol="0">
+            <a:spAutoFit/>
+          </a:bodyPr>
+          <a:lstStyle/>
+          <a:p>
+            <a:r>
+              <a:rPr lang="en-US" dirty="0" smtClean="0"/>
+              <a:t>Little modulation at fast time scales</a:t>
+            </a:r>
+            <a:endParaRPr lang="en-US" dirty="0"/>
+          </a:p>
+        </p:txBody>
+      </p:sp>
     </p:spTree>
     <p:extLst>
       <p:ext uri="{BB962C8B-B14F-4D97-AF65-F5344CB8AC3E}">
         <p14:creationId xmlns:p14="http://schemas.microsoft.com/office/powerpoint/2010/main" val="3186101674"/>
+      </p:ext>
+    </p:extLst>
+  </p:cSld>
+  <p:clrMapOvr>
+    <a:masterClrMapping/>
+  </p:clrMapOvr>
+  <p:timing>
+    <p:tnLst>
+      <p:par>
+        <p:cTn xmlns:p14="http://schemas.microsoft.com/office/powerpoint/2010/main" id="1" dur="indefinite" restart="never" nodeType="tmRoot"/>
+      </p:par>
+    </p:tnLst>
+  </p:timing>
+</p:sld>
+</file>
+
+<file path=ppt/slides/slide7.xml><?xml version="1.0" encoding="utf-8"?>
+<p:sld xmlns:a="http://schemas.openxmlformats.org/drawingml/2006/main" xmlns:r="http://schemas.openxmlformats.org/officeDocument/2006/relationships" xmlns:p="http://schemas.openxmlformats.org/presentationml/2006/main">
+  <p:cSld>
+    <p:spTree>
+      <p:nvGrpSpPr>
+        <p:cNvPr id="1" name=""/>
+        <p:cNvGrpSpPr/>
+        <p:nvPr/>
+      </p:nvGrpSpPr>
+      <p:grpSpPr>
+        <a:xfrm>
+          <a:off x="0" y="0"/>
+          <a:ext cx="0" cy="0"/>
+          <a:chOff x="0" y="0"/>
+          <a:chExt cx="0" cy="0"/>
+        </a:xfrm>
+      </p:grpSpPr>
+      <p:sp>
+        <p:nvSpPr>
+          <p:cNvPr id="2" name="Title 1"/>
+          <p:cNvSpPr>
+            <a:spLocks noGrp="1"/>
+          </p:cNvSpPr>
+          <p:nvPr>
+            <p:ph type="title"/>
+          </p:nvPr>
+        </p:nvSpPr>
+        <p:spPr/>
+        <p:txBody>
+          <a:bodyPr>
+            <a:normAutofit/>
+          </a:bodyPr>
+          <a:lstStyle/>
+          <a:p>
+            <a:r>
+              <a:rPr lang="en-US" sz="3600" dirty="0" smtClean="0"/>
+              <a:t>EC2 </a:t>
+            </a:r>
+            <a:r>
+              <a:rPr lang="en-US" sz="3600" dirty="0" err="1" smtClean="0"/>
+              <a:t>cpu</a:t>
+            </a:r>
+            <a:r>
+              <a:rPr lang="en-US" sz="3600" dirty="0" smtClean="0"/>
+              <a:t> utilization data (5 min resolution)</a:t>
+            </a:r>
+            <a:endParaRPr lang="en-US" sz="3600" dirty="0"/>
+          </a:p>
+        </p:txBody>
+      </p:sp>
+      <p:pic>
+        <p:nvPicPr>
+          <p:cNvPr id="3" name="Picture 2" descr="ec2_cpu_utilization_24ae8d.csvwavelet_transform.pdf"/>
+          <p:cNvPicPr>
+            <a:picLocks noChangeAspect="1"/>
+          </p:cNvPicPr>
+          <p:nvPr/>
+        </p:nvPicPr>
+        <p:blipFill>
+          <a:blip r:embed="rId2">
+            <a:extLst>
+              <a:ext uri="{28A0092B-C50C-407E-A947-70E740481C1C}">
+                <a14:useLocalDpi xmlns:a14="http://schemas.microsoft.com/office/drawing/2010/main" val="0"/>
+              </a:ext>
+            </a:extLst>
+          </a:blip>
+          <a:stretch>
+            <a:fillRect/>
+          </a:stretch>
+        </p:blipFill>
+        <p:spPr>
+          <a:xfrm>
+            <a:off x="894976" y="1193800"/>
+            <a:ext cx="7315200" cy="5486400"/>
+          </a:xfrm>
+          <a:prstGeom prst="rect">
+            <a:avLst/>
+          </a:prstGeom>
+        </p:spPr>
+      </p:pic>
+    </p:spTree>
+    <p:extLst>
+      <p:ext uri="{BB962C8B-B14F-4D97-AF65-F5344CB8AC3E}">
+        <p14:creationId xmlns:p14="http://schemas.microsoft.com/office/powerpoint/2010/main" val="30830755"/>
       </p:ext>
     </p:extLst>
   </p:cSld>
@@ -5023,7 +5835,7 @@
       </p:grpSpPr>
       <p:sp>
         <p:nvSpPr>
-          <p:cNvPr id="2" name="Title 1"/>
+          <p:cNvPr id="6" name="Title 1"/>
           <p:cNvSpPr>
             <a:spLocks noGrp="1"/>
           </p:cNvSpPr>
@@ -5031,32 +5843,37 @@
             <p:ph type="title"/>
           </p:nvPr>
         </p:nvSpPr>
-        <p:spPr/>
+        <p:spPr>
+          <a:xfrm>
+            <a:off x="457200" y="274638"/>
+            <a:ext cx="8229600" cy="1143000"/>
+          </a:xfrm>
+        </p:spPr>
         <p:txBody>
           <a:bodyPr>
-            <a:normAutofit/>
+            <a:noAutofit/>
           </a:bodyPr>
           <a:lstStyle/>
           <a:p>
             <a:r>
-              <a:rPr lang="en-US" sz="3600" dirty="0" smtClean="0"/>
-              <a:t>EC2 </a:t>
-            </a:r>
-            <a:r>
-              <a:rPr lang="en-US" sz="3600" dirty="0" err="1" smtClean="0"/>
-              <a:t>cpu</a:t>
-            </a:r>
-            <a:r>
-              <a:rPr lang="en-US" sz="3600" dirty="0" smtClean="0"/>
-              <a:t> utilization data (5 min resolution)</a:t>
-            </a:r>
-            <a:endParaRPr lang="en-US" sz="3600" dirty="0"/>
+              <a:rPr lang="en-US" sz="2800" dirty="0" smtClean="0"/>
+              <a:t>Significant modulation at fast time scales, </a:t>
+            </a:r>
+            <a:r>
+              <a:rPr lang="en-US" sz="2800" dirty="0" smtClean="0"/>
+              <a:t>we shouldn’t </a:t>
+            </a:r>
+            <a:r>
+              <a:rPr lang="en-US" sz="2800" dirty="0" smtClean="0"/>
+              <a:t>apply data aggregation</a:t>
+            </a:r>
+            <a:endParaRPr lang="en-US" sz="2800" dirty="0"/>
           </a:p>
         </p:txBody>
       </p:sp>
       <p:pic>
         <p:nvPicPr>
-          <p:cNvPr id="4" name="Picture 3" descr="ec2_cpu_utilization_53ea38wavelet_transform.pdf"/>
+          <p:cNvPr id="2" name="Picture 1" descr="ec2_cpu_utilization_24ae8d.csvaggregation_time_scale.pdf"/>
           <p:cNvPicPr>
             <a:picLocks noChangeAspect="1"/>
           </p:cNvPicPr>
@@ -5076,7 +5893,7 @@
         </p:blipFill>
         <p:spPr>
           <a:xfrm>
-            <a:off x="863601" y="1417638"/>
+            <a:off x="1024965" y="1417638"/>
             <a:ext cx="7315200" cy="5486400"/>
           </a:xfrm>
           <a:prstGeom prst="rect">
@@ -5084,16 +5901,83 @@
           </a:prstGeom>
         </p:spPr>
       </p:pic>
+      <p:sp>
+        <p:nvSpPr>
+          <p:cNvPr id="5" name="TextBox 4"/>
+          <p:cNvSpPr txBox="1"/>
+          <p:nvPr/>
+        </p:nvSpPr>
+        <p:spPr>
+          <a:xfrm>
+            <a:off x="1960281" y="2428194"/>
+            <a:ext cx="1991659" cy="646331"/>
+          </a:xfrm>
+          <a:prstGeom prst="rect">
+            <a:avLst/>
+          </a:prstGeom>
+          <a:noFill/>
+        </p:spPr>
+        <p:txBody>
+          <a:bodyPr wrap="square" rtlCol="0">
+            <a:spAutoFit/>
+          </a:bodyPr>
+          <a:lstStyle/>
+          <a:p>
+            <a:r>
+              <a:rPr lang="en-US" dirty="0" smtClean="0"/>
+              <a:t>Strong modulation at fast time scales</a:t>
+            </a:r>
+            <a:endParaRPr lang="en-US" dirty="0"/>
+          </a:p>
+        </p:txBody>
+      </p:sp>
+      <p:sp>
+        <p:nvSpPr>
+          <p:cNvPr id="7" name="TextBox 6"/>
+          <p:cNvSpPr txBox="1"/>
+          <p:nvPr/>
+        </p:nvSpPr>
+        <p:spPr>
+          <a:xfrm>
+            <a:off x="5564093" y="2257428"/>
+            <a:ext cx="1991659" cy="646331"/>
+          </a:xfrm>
+          <a:prstGeom prst="rect">
+            <a:avLst/>
+          </a:prstGeom>
+          <a:noFill/>
+        </p:spPr>
+        <p:txBody>
+          <a:bodyPr wrap="square" rtlCol="0">
+            <a:spAutoFit/>
+          </a:bodyPr>
+          <a:lstStyle/>
+          <a:p>
+            <a:r>
+              <a:rPr lang="en-US" dirty="0" smtClean="0"/>
+              <a:t>No peak at the daily period</a:t>
+            </a:r>
+            <a:endParaRPr lang="en-US" dirty="0"/>
+          </a:p>
+        </p:txBody>
+      </p:sp>
     </p:spTree>
     <p:extLst>
       <p:ext uri="{BB962C8B-B14F-4D97-AF65-F5344CB8AC3E}">
-        <p14:creationId xmlns:p14="http://schemas.microsoft.com/office/powerpoint/2010/main" val="30830755"/>
+        <p14:creationId xmlns:p14="http://schemas.microsoft.com/office/powerpoint/2010/main" val="3430360098"/>
       </p:ext>
     </p:extLst>
   </p:cSld>
   <p:clrMapOvr>
     <a:masterClrMapping/>
   </p:clrMapOvr>
+  <p:timing>
+    <p:tnLst>
+      <p:par>
+        <p:cTn xmlns:p14="http://schemas.microsoft.com/office/powerpoint/2010/main" id="1" dur="indefinite" restart="never" nodeType="tmRoot"/>
+      </p:par>
+    </p:tnLst>
+  </p:timing>
 </p:sld>
 </file>
 
@@ -5114,15 +5998,40 @@
           <a:chExt cx="0" cy="0"/>
         </a:xfrm>
       </p:grpSpPr>
+      <p:sp>
+        <p:nvSpPr>
+          <p:cNvPr id="2" name="Title 1"/>
+          <p:cNvSpPr>
+            <a:spLocks noGrp="1"/>
+          </p:cNvSpPr>
+          <p:nvPr>
+            <p:ph type="title"/>
+          </p:nvPr>
+        </p:nvSpPr>
+        <p:spPr/>
+        <p:txBody>
+          <a:bodyPr>
+            <a:noAutofit/>
+          </a:bodyPr>
+          <a:lstStyle/>
+          <a:p>
+            <a:r>
+              <a:rPr lang="en-US" sz="3600" dirty="0" smtClean="0"/>
+              <a:t>Aggregation algorithm works for a wide range of threshold</a:t>
+            </a:r>
+            <a:endParaRPr lang="en-US" sz="3600" dirty="0"/>
+          </a:p>
+        </p:txBody>
+      </p:sp>
       <p:pic>
         <p:nvPicPr>
-          <p:cNvPr id="4" name="Picture 3" descr="ec2_cpu_utilization_53ea38aggregation_time_scale.pdf"/>
+          <p:cNvPr id="4" name="Picture 3" descr="AnomalyScore_Vs_AggregationThreshold.pdf"/>
           <p:cNvPicPr>
             <a:picLocks noChangeAspect="1"/>
           </p:cNvPicPr>
           <p:nvPr/>
         </p:nvPicPr>
-        <p:blipFill>
+        <p:blipFill rotWithShape="1">
           <a:blip r:embed="rId2">
             <a:extLst>
               <a:ext uri="{28A0092B-C50C-407E-A947-70E740481C1C}">
@@ -5130,60 +6039,69 @@
               </a:ext>
             </a:extLst>
           </a:blip>
-          <a:stretch>
-            <a:fillRect/>
-          </a:stretch>
+          <a:srcRect t="6509"/>
+          <a:stretch/>
         </p:blipFill>
         <p:spPr>
           <a:xfrm>
-            <a:off x="1016000" y="1371600"/>
-            <a:ext cx="7315200" cy="5486400"/>
+            <a:off x="1032933" y="1576294"/>
+            <a:ext cx="7315200" cy="5129306"/>
           </a:xfrm>
           <a:prstGeom prst="rect">
             <a:avLst/>
           </a:prstGeom>
         </p:spPr>
       </p:pic>
-      <p:sp>
-        <p:nvSpPr>
-          <p:cNvPr id="6" name="Title 1"/>
-          <p:cNvSpPr>
-            <a:spLocks noGrp="1"/>
-          </p:cNvSpPr>
-          <p:nvPr>
-            <p:ph type="title"/>
-          </p:nvPr>
-        </p:nvSpPr>
+      <p:cxnSp>
+        <p:nvCxnSpPr>
+          <p:cNvPr id="6" name="Straight Connector 5"/>
+          <p:cNvCxnSpPr/>
+          <p:nvPr/>
+        </p:nvCxnSpPr>
         <p:spPr>
           <a:xfrm>
-            <a:off x="457200" y="274638"/>
-            <a:ext cx="8229600" cy="1143000"/>
+            <a:off x="4762257" y="1718001"/>
+            <a:ext cx="56026" cy="4463069"/>
           </a:xfrm>
+          <a:prstGeom prst="line">
+            <a:avLst/>
+          </a:prstGeom>
+          <a:ln>
+            <a:prstDash val="sysDash"/>
+          </a:ln>
         </p:spPr>
-        <p:txBody>
-          <a:bodyPr>
-            <a:noAutofit/>
-          </a:bodyPr>
-          <a:lstStyle/>
-          <a:p>
-            <a:r>
-              <a:rPr lang="en-US" sz="2800" dirty="0" smtClean="0"/>
-              <a:t>Significant modulation at fast time scales, shouldn’t apply data aggregation</a:t>
-            </a:r>
-            <a:endParaRPr lang="en-US" sz="2800" dirty="0"/>
-          </a:p>
-        </p:txBody>
-      </p:sp>
+        <p:style>
+          <a:lnRef idx="2">
+            <a:schemeClr val="accent1"/>
+          </a:lnRef>
+          <a:fillRef idx="0">
+            <a:schemeClr val="accent1"/>
+          </a:fillRef>
+          <a:effectRef idx="1">
+            <a:schemeClr val="accent1"/>
+          </a:effectRef>
+          <a:fontRef idx="minor">
+            <a:schemeClr val="tx1"/>
+          </a:fontRef>
+        </p:style>
+      </p:cxnSp>
     </p:spTree>
     <p:extLst>
       <p:ext uri="{BB962C8B-B14F-4D97-AF65-F5344CB8AC3E}">
-        <p14:creationId xmlns:p14="http://schemas.microsoft.com/office/powerpoint/2010/main" val="3430360098"/>
+        <p14:creationId xmlns:p14="http://schemas.microsoft.com/office/powerpoint/2010/main" val="467737896"/>
       </p:ext>
     </p:extLst>
   </p:cSld>
   <p:clrMapOvr>
     <a:masterClrMapping/>
   </p:clrMapOvr>
+  <p:timing>
+    <p:tnLst>
+      <p:par>
+        <p:cTn xmlns:p14="http://schemas.microsoft.com/office/powerpoint/2010/main" id="1" dur="indefinite" restart="never" nodeType="tmRoot"/>
+      </p:par>
+    </p:tnLst>
+  </p:timing>
 </p:sld>
 </file>
 

</xml_diff>